<commit_message>
Updated the PPTX files with respective speaker info; created PDF version
</commit_message>
<xml_diff>
--- a/docs/slides/iot313R1_builder_slides.pptx
+++ b/docs/slides/iot313R1_builder_slides.pptx
@@ -284,7 +284,7 @@
                 <a:ea typeface="Amazon Ember" panose="020B0603020204020204" pitchFamily="34" charset="0"/>
                 <a:cs typeface="Amazon Ember" panose="020B0603020204020204" pitchFamily="34" charset="0"/>
               </a:rPr>
-              <a:t>11/25/18 9:26 AM</a:t>
+              <a:t>11/26/18 3:22 PM</a:t>
             </a:fld>
             <a:endParaRPr lang="en-US" dirty="0">
               <a:latin typeface="Amazon Ember" panose="020B0603020204020204" pitchFamily="34" charset="0"/>
@@ -569,7 +569,7 @@
             <a:fld id="{CA8E1BB1-B036-4140-B110-296DC0701D04}" type="datetime8">
               <a:rPr lang="en-US" smtClean="0"/>
               <a:pPr/>
-              <a:t>11/25/18 9:26 AM</a:t>
+              <a:t>11/26/18 3:22 PM</a:t>
             </a:fld>
             <a:endParaRPr lang="en-US" dirty="0"/>
           </a:p>
@@ -932,7 +932,7 @@
           <a:p>
             <a:fld id="{7785AE33-8762-CB48-8069-61FC714534F0}" type="datetime8">
               <a:rPr lang="en-US" smtClean="0"/>
-              <a:t>11/25/18 9:26 AM</a:t>
+              <a:t>11/26/18 3:22 PM</a:t>
             </a:fld>
             <a:endParaRPr lang="en-US" dirty="0"/>
           </a:p>
@@ -1097,7 +1097,7 @@
           <a:p>
             <a:fld id="{01882E56-9BBC-5549-962E-8E06798B1869}" type="datetime8">
               <a:rPr lang="en-US" smtClean="0"/>
-              <a:t>11/25/18 9:31 AM</a:t>
+              <a:t>11/26/18 3:22 PM</a:t>
             </a:fld>
             <a:endParaRPr lang="en-US" dirty="0"/>
           </a:p>
@@ -9750,26 +9750,48 @@
             <p:ph type="body" sz="quarter" idx="14"/>
           </p:nvPr>
         </p:nvSpPr>
-        <p:spPr/>
+        <p:spPr>
+          <a:xfrm>
+            <a:off x="323850" y="4652963"/>
+            <a:ext cx="10458448" cy="2263652"/>
+          </a:xfrm>
+        </p:spPr>
         <p:txBody>
           <a:bodyPr/>
           <a:lstStyle/>
           <a:p>
             <a:r>
               <a:rPr lang="en-US" dirty="0"/>
-              <a:t>Dan Miller</a:t>
-            </a:r>
-          </a:p>
-          <a:p>
-            <a:r>
-              <a:rPr lang="en-US" dirty="0"/>
-              <a:t>Sr SW Dev Engineer</a:t>
-            </a:r>
-          </a:p>
-          <a:p>
-            <a:r>
-              <a:rPr lang="en-US" dirty="0"/>
-              <a:t>Device Defender Group</a:t>
+              <a:t>Rob </a:t>
+            </a:r>
+            <a:r>
+              <a:rPr lang="en-US" dirty="0" err="1"/>
+              <a:t>Marano</a:t>
+            </a:r>
+            <a:endParaRPr lang="en-US" dirty="0"/>
+          </a:p>
+          <a:p>
+            <a:r>
+              <a:rPr lang="en-US" dirty="0">
+                <a:hlinkClick r:id="rId3"/>
+              </a:rPr>
+              <a:t>maranoro@amazon.com</a:t>
+            </a:r>
+            <a:r>
+              <a:rPr lang="en-US" dirty="0"/>
+              <a:t> </a:t>
+            </a:r>
+          </a:p>
+          <a:p>
+            <a:r>
+              <a:rPr lang="en-US" dirty="0"/>
+              <a:t>Principal Consultant</a:t>
+            </a:r>
+          </a:p>
+          <a:p>
+            <a:r>
+              <a:rPr lang="en-US" dirty="0"/>
+              <a:t>Professional Services</a:t>
             </a:r>
           </a:p>
           <a:p>
@@ -9900,7 +9922,7 @@
               <a:rPr lang="en-US" dirty="0">
                 <a:hlinkClick r:id="rId2"/>
               </a:rPr>
-              <a:t>https://github.com/aws-samples/aws-iot-device-defender-workshop/blob/master/docs/builder_session</a:t>
+              <a:t>https://github.com/aws-samples/aws-iot-device-defender-workshop/blob/master/docs/builder_session.md</a:t>
             </a:r>
             <a:endParaRPr lang="en-US" dirty="0"/>
           </a:p>
@@ -9954,7 +9976,7 @@
     </p:spTree>
     <p:extLst>
       <p:ext uri="{BB962C8B-B14F-4D97-AF65-F5344CB8AC3E}">
-        <p14:creationId xmlns:p14="http://schemas.microsoft.com/office/powerpoint/2010/main" val="3469652796"/>
+        <p14:creationId xmlns:p14="http://schemas.microsoft.com/office/powerpoint/2010/main" val="1915094087"/>
       </p:ext>
     </p:extLst>
   </p:cSld>
@@ -9986,10 +10008,10 @@
       </p:grpSpPr>
       <p:sp>
         <p:nvSpPr>
-          <p:cNvPr id="3" name="Text Placeholder 2">
+          <p:cNvPr id="5" name="Text Placeholder 4">
             <a:extLst>
               <a:ext uri="{FF2B5EF4-FFF2-40B4-BE49-F238E27FC236}">
-                <a16:creationId xmlns:a16="http://schemas.microsoft.com/office/drawing/2014/main" id="{CBD10F38-2636-4CED-A3FB-F0E2990384F9}"/>
+                <a16:creationId xmlns:a16="http://schemas.microsoft.com/office/drawing/2014/main" id="{8FA91A97-F860-4F4A-B74F-8CCA2307A852}"/>
               </a:ext>
             </a:extLst>
           </p:cNvPr>
@@ -10000,14 +10022,54 @@
             <p:ph type="body" sz="quarter" idx="14"/>
           </p:nvPr>
         </p:nvSpPr>
-        <p:spPr/>
+        <p:spPr>
+          <a:xfrm>
+            <a:off x="323850" y="4235192"/>
+            <a:ext cx="7448550" cy="2446962"/>
+          </a:xfrm>
+        </p:spPr>
         <p:txBody>
           <a:bodyPr/>
           <a:lstStyle/>
           <a:p>
             <a:r>
               <a:rPr lang="en-US" dirty="0"/>
-              <a:t>Dan Miller</a:t>
+              <a:t>Rob </a:t>
+            </a:r>
+            <a:r>
+              <a:rPr lang="en-US" dirty="0" err="1"/>
+              <a:t>Marano</a:t>
+            </a:r>
+            <a:endParaRPr lang="en-US" dirty="0"/>
+          </a:p>
+          <a:p>
+            <a:r>
+              <a:rPr lang="en-US" dirty="0">
+                <a:hlinkClick r:id="rId2"/>
+              </a:rPr>
+              <a:t>maranoro@amazon.com</a:t>
+            </a:r>
+            <a:r>
+              <a:rPr lang="en-US" dirty="0"/>
+              <a:t> </a:t>
+            </a:r>
+          </a:p>
+          <a:p>
+            <a:r>
+              <a:rPr lang="en-US" dirty="0"/>
+              <a:t>Principal Consultant</a:t>
+            </a:r>
+          </a:p>
+          <a:p>
+            <a:r>
+              <a:rPr lang="en-US" dirty="0"/>
+              <a:t>Professional Services</a:t>
+            </a:r>
+          </a:p>
+          <a:p>
+            <a:r>
+              <a:rPr lang="en-US" dirty="0"/>
+              <a:t>AWS</a:t>
             </a:r>
           </a:p>
         </p:txBody>
@@ -10015,7 +10077,7 @@
     </p:spTree>
     <p:extLst>
       <p:ext uri="{BB962C8B-B14F-4D97-AF65-F5344CB8AC3E}">
-        <p14:creationId xmlns:p14="http://schemas.microsoft.com/office/powerpoint/2010/main" val="3123727739"/>
+        <p14:creationId xmlns:p14="http://schemas.microsoft.com/office/powerpoint/2010/main" val="2017168905"/>
       </p:ext>
     </p:extLst>
   </p:cSld>
@@ -10048,7 +10110,7 @@
     </p:spTree>
     <p:extLst>
       <p:ext uri="{BB962C8B-B14F-4D97-AF65-F5344CB8AC3E}">
-        <p14:creationId xmlns:p14="http://schemas.microsoft.com/office/powerpoint/2010/main" val="2086345359"/>
+        <p14:creationId xmlns:p14="http://schemas.microsoft.com/office/powerpoint/2010/main" val="1496734469"/>
       </p:ext>
     </p:extLst>
   </p:cSld>
@@ -10814,12 +10876,6 @@
 </file>
 
 <file path=customXml/item1.xml><?xml version="1.0" encoding="utf-8"?>
-<p:properties xmlns:p="http://schemas.microsoft.com/office/2006/metadata/properties" xmlns:xsi="http://www.w3.org/2001/XMLSchema-instance" xmlns:pc="http://schemas.microsoft.com/office/infopath/2007/PartnerControls">
-  <documentManagement/>
-</p:properties>
-</file>
-
-<file path=customXml/item2.xml><?xml version="1.0" encoding="utf-8"?>
 <?mso-contentType ?>
 <FormTemplates xmlns="http://schemas.microsoft.com/sharepoint/v3/contenttype/forms">
   <Display>DocumentLibraryForm</Display>
@@ -10828,7 +10884,7 @@
 </FormTemplates>
 </file>
 
-<file path=customXml/item3.xml><?xml version="1.0" encoding="utf-8"?>
+<file path=customXml/item2.xml><?xml version="1.0" encoding="utf-8"?>
 <ct:contentTypeSchema xmlns:ct="http://schemas.microsoft.com/office/2006/metadata/contentType" xmlns:ma="http://schemas.microsoft.com/office/2006/metadata/properties/metaAttributes" ct:_="" ma:_="" ma:contentTypeName="Document" ma:contentTypeID="0x010100A2B0BB5962AB3C45A9A1CE1EC4C4F647" ma:contentTypeVersion="1" ma:contentTypeDescription="Create a new document." ma:contentTypeScope="" ma:versionID="39dd6e28de13981fc99600d481b1de5c">
   <xsd:schema xmlns:xsd="http://www.w3.org/2001/XMLSchema" xmlns:xs="http://www.w3.org/2001/XMLSchema" xmlns:p="http://schemas.microsoft.com/office/2006/metadata/properties" xmlns:ns3="630a2e83-186a-4a0f-ab27-bee8a8096abc" targetNamespace="http://schemas.microsoft.com/office/2006/metadata/properties" ma:root="true" ma:fieldsID="e5a18a002045f9f0e2a3c9cc06ab2675" ns3:_="">
     <xsd:import namespace="630a2e83-186a-4a0f-ab27-bee8a8096abc"/>
@@ -10968,23 +11024,13 @@
 </ct:contentTypeSchema>
 </file>
 
-<file path=customXml/itemProps1.xml><?xml version="1.0" encoding="utf-8"?>
-<ds:datastoreItem xmlns:ds="http://schemas.openxmlformats.org/officeDocument/2006/customXml" ds:itemID="{F990F116-B58F-4255-B05B-DA3808E0E5C6}">
-  <ds:schemaRefs>
-    <ds:schemaRef ds:uri="http://purl.org/dc/dcmitype/"/>
-    <ds:schemaRef ds:uri="http://schemas.microsoft.com/office/infopath/2007/PartnerControls"/>
-    <ds:schemaRef ds:uri="http://schemas.microsoft.com/office/2006/documentManagement/types"/>
-    <ds:schemaRef ds:uri="http://purl.org/dc/elements/1.1/"/>
-    <ds:schemaRef ds:uri="http://schemas.microsoft.com/office/2006/metadata/properties"/>
-    <ds:schemaRef ds:uri="http://purl.org/dc/terms/"/>
-    <ds:schemaRef ds:uri="http://schemas.openxmlformats.org/package/2006/metadata/core-properties"/>
-    <ds:schemaRef ds:uri="630a2e83-186a-4a0f-ab27-bee8a8096abc"/>
-    <ds:schemaRef ds:uri="http://www.w3.org/XML/1998/namespace"/>
-  </ds:schemaRefs>
-</ds:datastoreItem>
+<file path=customXml/item3.xml><?xml version="1.0" encoding="utf-8"?>
+<p:properties xmlns:p="http://schemas.microsoft.com/office/2006/metadata/properties" xmlns:xsi="http://www.w3.org/2001/XMLSchema-instance" xmlns:pc="http://schemas.microsoft.com/office/infopath/2007/PartnerControls">
+  <documentManagement/>
+</p:properties>
 </file>
 
-<file path=customXml/itemProps2.xml><?xml version="1.0" encoding="utf-8"?>
+<file path=customXml/itemProps1.xml><?xml version="1.0" encoding="utf-8"?>
 <ds:datastoreItem xmlns:ds="http://schemas.openxmlformats.org/officeDocument/2006/customXml" ds:itemID="{758FDAC0-319D-4A54-8D8E-1D42CB1F8004}">
   <ds:schemaRefs>
     <ds:schemaRef ds:uri="http://schemas.microsoft.com/sharepoint/v3/contenttype/forms"/>
@@ -10992,7 +11038,7 @@
 </ds:datastoreItem>
 </file>
 
-<file path=customXml/itemProps3.xml><?xml version="1.0" encoding="utf-8"?>
+<file path=customXml/itemProps2.xml><?xml version="1.0" encoding="utf-8"?>
 <ds:datastoreItem xmlns:ds="http://schemas.openxmlformats.org/officeDocument/2006/customXml" ds:itemID="{942678F0-6EA3-4F58-92F2-E73D80B53613}">
   <ds:schemaRefs>
     <ds:schemaRef ds:uri="http://schemas.microsoft.com/office/2006/metadata/contentType"/>
@@ -11008,4 +11054,20 @@
     <ds:schemaRef ds:uri="http://schemas.microsoft.com/internal/obd"/>
   </ds:schemaRefs>
 </ds:datastoreItem>
+</file>
+
+<file path=customXml/itemProps3.xml><?xml version="1.0" encoding="utf-8"?>
+<ds:datastoreItem xmlns:ds="http://schemas.openxmlformats.org/officeDocument/2006/customXml" ds:itemID="{F990F116-B58F-4255-B05B-DA3808E0E5C6}">
+  <ds:schemaRefs>
+    <ds:schemaRef ds:uri="http://purl.org/dc/dcmitype/"/>
+    <ds:schemaRef ds:uri="http://schemas.microsoft.com/office/infopath/2007/PartnerControls"/>
+    <ds:schemaRef ds:uri="http://schemas.microsoft.com/office/2006/documentManagement/types"/>
+    <ds:schemaRef ds:uri="http://purl.org/dc/elements/1.1/"/>
+    <ds:schemaRef ds:uri="http://schemas.microsoft.com/office/2006/metadata/properties"/>
+    <ds:schemaRef ds:uri="http://purl.org/dc/terms/"/>
+    <ds:schemaRef ds:uri="http://schemas.openxmlformats.org/package/2006/metadata/core-properties"/>
+    <ds:schemaRef ds:uri="630a2e83-186a-4a0f-ab27-bee8a8096abc"/>
+    <ds:schemaRef ds:uri="http://www.w3.org/XML/1998/namespace"/>
+  </ds:schemaRefs>
+</ds:datastoreItem>
 </file>
</xml_diff>